<commit_message>
#20 Create MySQL database based on schema
</commit_message>
<xml_diff>
--- a/diagrams/Diagrams.pptx
+++ b/diagrams/Diagrams.pptx
@@ -515,7 +515,7 @@
           <a:p>
             <a:fld id="{19677C02-9FA9-F74D-89C2-FBA48B1B8578}" type="datetimeFigureOut">
               <a:rPr lang="en-US" smtClean="0"/>
-              <a:t>2/27/24</a:t>
+              <a:t>2/28/24</a:t>
             </a:fld>
             <a:endParaRPr lang="en-US"/>
           </a:p>
@@ -713,7 +713,7 @@
           <a:p>
             <a:fld id="{19677C02-9FA9-F74D-89C2-FBA48B1B8578}" type="datetimeFigureOut">
               <a:rPr lang="en-US" smtClean="0"/>
-              <a:t>2/27/24</a:t>
+              <a:t>2/28/24</a:t>
             </a:fld>
             <a:endParaRPr lang="en-US"/>
           </a:p>
@@ -921,7 +921,7 @@
           <a:p>
             <a:fld id="{19677C02-9FA9-F74D-89C2-FBA48B1B8578}" type="datetimeFigureOut">
               <a:rPr lang="en-US" smtClean="0"/>
-              <a:t>2/27/24</a:t>
+              <a:t>2/28/24</a:t>
             </a:fld>
             <a:endParaRPr lang="en-US"/>
           </a:p>
@@ -1119,7 +1119,7 @@
           <a:p>
             <a:fld id="{19677C02-9FA9-F74D-89C2-FBA48B1B8578}" type="datetimeFigureOut">
               <a:rPr lang="en-US" smtClean="0"/>
-              <a:t>2/27/24</a:t>
+              <a:t>2/28/24</a:t>
             </a:fld>
             <a:endParaRPr lang="en-US"/>
           </a:p>
@@ -1394,7 +1394,7 @@
           <a:p>
             <a:fld id="{19677C02-9FA9-F74D-89C2-FBA48B1B8578}" type="datetimeFigureOut">
               <a:rPr lang="en-US" smtClean="0"/>
-              <a:t>2/27/24</a:t>
+              <a:t>2/28/24</a:t>
             </a:fld>
             <a:endParaRPr lang="en-US"/>
           </a:p>
@@ -1659,7 +1659,7 @@
           <a:p>
             <a:fld id="{19677C02-9FA9-F74D-89C2-FBA48B1B8578}" type="datetimeFigureOut">
               <a:rPr lang="en-US" smtClean="0"/>
-              <a:t>2/27/24</a:t>
+              <a:t>2/28/24</a:t>
             </a:fld>
             <a:endParaRPr lang="en-US"/>
           </a:p>
@@ -2071,7 +2071,7 @@
           <a:p>
             <a:fld id="{19677C02-9FA9-F74D-89C2-FBA48B1B8578}" type="datetimeFigureOut">
               <a:rPr lang="en-US" smtClean="0"/>
-              <a:t>2/27/24</a:t>
+              <a:t>2/28/24</a:t>
             </a:fld>
             <a:endParaRPr lang="en-US"/>
           </a:p>
@@ -2212,7 +2212,7 @@
           <a:p>
             <a:fld id="{19677C02-9FA9-F74D-89C2-FBA48B1B8578}" type="datetimeFigureOut">
               <a:rPr lang="en-US" smtClean="0"/>
-              <a:t>2/27/24</a:t>
+              <a:t>2/28/24</a:t>
             </a:fld>
             <a:endParaRPr lang="en-US"/>
           </a:p>
@@ -2325,7 +2325,7 @@
           <a:p>
             <a:fld id="{19677C02-9FA9-F74D-89C2-FBA48B1B8578}" type="datetimeFigureOut">
               <a:rPr lang="en-US" smtClean="0"/>
-              <a:t>2/27/24</a:t>
+              <a:t>2/28/24</a:t>
             </a:fld>
             <a:endParaRPr lang="en-US"/>
           </a:p>
@@ -2636,7 +2636,7 @@
           <a:p>
             <a:fld id="{19677C02-9FA9-F74D-89C2-FBA48B1B8578}" type="datetimeFigureOut">
               <a:rPr lang="en-US" smtClean="0"/>
-              <a:t>2/27/24</a:t>
+              <a:t>2/28/24</a:t>
             </a:fld>
             <a:endParaRPr lang="en-US"/>
           </a:p>
@@ -2924,7 +2924,7 @@
           <a:p>
             <a:fld id="{19677C02-9FA9-F74D-89C2-FBA48B1B8578}" type="datetimeFigureOut">
               <a:rPr lang="en-US" smtClean="0"/>
-              <a:t>2/27/24</a:t>
+              <a:t>2/28/24</a:t>
             </a:fld>
             <a:endParaRPr lang="en-US"/>
           </a:p>
@@ -3165,7 +3165,7 @@
           <a:p>
             <a:fld id="{19677C02-9FA9-F74D-89C2-FBA48B1B8578}" type="datetimeFigureOut">
               <a:rPr lang="en-US" smtClean="0"/>
-              <a:t>2/27/24</a:t>
+              <a:t>2/28/24</a:t>
             </a:fld>
             <a:endParaRPr lang="en-US"/>
           </a:p>
@@ -5160,7 +5160,7 @@
           <p:nvPr>
             <p:extLst>
               <p:ext uri="{D42A27DB-BD31-4B8C-83A1-F6EECF244321}">
-                <p14:modId xmlns:p14="http://schemas.microsoft.com/office/powerpoint/2010/main" val="533687011"/>
+                <p14:modId xmlns:p14="http://schemas.microsoft.com/office/powerpoint/2010/main" val="2615094028"/>
               </p:ext>
             </p:extLst>
           </p:nvPr>
@@ -5667,14 +5667,14 @@
           <p:nvPr>
             <p:extLst>
               <p:ext uri="{D42A27DB-BD31-4B8C-83A1-F6EECF244321}">
-                <p14:modId xmlns:p14="http://schemas.microsoft.com/office/powerpoint/2010/main" val="2622061748"/>
+                <p14:modId xmlns:p14="http://schemas.microsoft.com/office/powerpoint/2010/main" val="3627424030"/>
               </p:ext>
             </p:extLst>
           </p:nvPr>
         </p:nvGraphicFramePr>
         <p:xfrm>
-          <a:off x="1043008" y="465666"/>
-          <a:ext cx="4536966" cy="2595880"/>
+          <a:off x="1043008" y="117571"/>
+          <a:ext cx="4536966" cy="2966720"/>
         </p:xfrm>
         <a:graphic>
           <a:graphicData uri="http://schemas.openxmlformats.org/drawingml/2006/table">
@@ -6890,6 +6890,181 @@
                   </a:ext>
                 </a:extLst>
               </a:tr>
+              <a:tr h="370840">
+                <a:tc>
+                  <a:txBody>
+                    <a:bodyPr/>
+                    <a:lstStyle/>
+                    <a:p>
+                      <a:r>
+                        <a:rPr lang="en-US" dirty="0">
+                          <a:solidFill>
+                            <a:schemeClr val="tx1"/>
+                          </a:solidFill>
+                        </a:rPr>
+                        <a:t>int</a:t>
+                      </a:r>
+                    </a:p>
+                  </a:txBody>
+                  <a:tcPr>
+                    <a:lnL w="12700" cap="flat" cmpd="sng" algn="ctr">
+                      <a:solidFill>
+                        <a:schemeClr val="tx1"/>
+                      </a:solidFill>
+                      <a:prstDash val="solid"/>
+                      <a:round/>
+                      <a:headEnd type="none" w="med" len="med"/>
+                      <a:tailEnd type="none" w="med" len="med"/>
+                    </a:lnL>
+                    <a:lnR w="12700" cap="flat" cmpd="sng" algn="ctr">
+                      <a:solidFill>
+                        <a:schemeClr val="tx1"/>
+                      </a:solidFill>
+                      <a:prstDash val="solid"/>
+                      <a:round/>
+                      <a:headEnd type="none" w="med" len="med"/>
+                      <a:tailEnd type="none" w="med" len="med"/>
+                    </a:lnR>
+                    <a:lnT w="12700" cap="flat" cmpd="sng" algn="ctr">
+                      <a:solidFill>
+                        <a:schemeClr val="tx1"/>
+                      </a:solidFill>
+                      <a:prstDash val="solid"/>
+                      <a:round/>
+                      <a:headEnd type="none" w="med" len="med"/>
+                      <a:tailEnd type="none" w="med" len="med"/>
+                    </a:lnT>
+                    <a:lnB w="12700" cap="flat" cmpd="sng" algn="ctr">
+                      <a:solidFill>
+                        <a:schemeClr val="tx1"/>
+                      </a:solidFill>
+                      <a:prstDash val="solid"/>
+                      <a:round/>
+                      <a:headEnd type="none" w="med" len="med"/>
+                      <a:tailEnd type="none" w="med" len="med"/>
+                    </a:lnB>
+                    <a:solidFill>
+                      <a:srgbClr val="F2F2F2"/>
+                    </a:solidFill>
+                  </a:tcPr>
+                </a:tc>
+                <a:tc>
+                  <a:txBody>
+                    <a:bodyPr/>
+                    <a:lstStyle/>
+                    <a:p>
+                      <a:r>
+                        <a:rPr lang="en-US" dirty="0">
+                          <a:solidFill>
+                            <a:schemeClr val="tx1"/>
+                          </a:solidFill>
+                        </a:rPr>
+                        <a:t>bpm</a:t>
+                      </a:r>
+                    </a:p>
+                  </a:txBody>
+                  <a:tcPr>
+                    <a:lnL w="12700" cap="flat" cmpd="sng" algn="ctr">
+                      <a:solidFill>
+                        <a:schemeClr val="tx1"/>
+                      </a:solidFill>
+                      <a:prstDash val="solid"/>
+                      <a:round/>
+                      <a:headEnd type="none" w="med" len="med"/>
+                      <a:tailEnd type="none" w="med" len="med"/>
+                    </a:lnL>
+                    <a:lnR w="12700" cap="flat" cmpd="sng" algn="ctr">
+                      <a:solidFill>
+                        <a:schemeClr val="tx1"/>
+                      </a:solidFill>
+                      <a:prstDash val="solid"/>
+                      <a:round/>
+                      <a:headEnd type="none" w="med" len="med"/>
+                      <a:tailEnd type="none" w="med" len="med"/>
+                    </a:lnR>
+                    <a:lnT w="12700" cap="flat" cmpd="sng" algn="ctr">
+                      <a:solidFill>
+                        <a:schemeClr val="tx1"/>
+                      </a:solidFill>
+                      <a:prstDash val="solid"/>
+                      <a:round/>
+                      <a:headEnd type="none" w="med" len="med"/>
+                      <a:tailEnd type="none" w="med" len="med"/>
+                    </a:lnT>
+                    <a:lnB w="12700" cap="flat" cmpd="sng" algn="ctr">
+                      <a:solidFill>
+                        <a:schemeClr val="tx1"/>
+                      </a:solidFill>
+                      <a:prstDash val="solid"/>
+                      <a:round/>
+                      <a:headEnd type="none" w="med" len="med"/>
+                      <a:tailEnd type="none" w="med" len="med"/>
+                    </a:lnB>
+                    <a:solidFill>
+                      <a:srgbClr val="F2F2F2"/>
+                    </a:solidFill>
+                  </a:tcPr>
+                </a:tc>
+                <a:tc>
+                  <a:txBody>
+                    <a:bodyPr/>
+                    <a:lstStyle/>
+                    <a:p>
+                      <a:endParaRPr lang="en-US" dirty="0">
+                        <a:solidFill>
+                          <a:schemeClr val="tx1"/>
+                        </a:solidFill>
+                      </a:endParaRPr>
+                    </a:p>
+                  </a:txBody>
+                  <a:tcPr>
+                    <a:lnL w="12700" cap="flat" cmpd="sng" algn="ctr">
+                      <a:solidFill>
+                        <a:schemeClr val="tx1"/>
+                      </a:solidFill>
+                      <a:prstDash val="solid"/>
+                      <a:round/>
+                      <a:headEnd type="none" w="med" len="med"/>
+                      <a:tailEnd type="none" w="med" len="med"/>
+                    </a:lnL>
+                    <a:lnR w="12700" cap="flat" cmpd="sng" algn="ctr">
+                      <a:solidFill>
+                        <a:schemeClr val="tx1"/>
+                      </a:solidFill>
+                      <a:prstDash val="solid"/>
+                      <a:round/>
+                      <a:headEnd type="none" w="med" len="med"/>
+                      <a:tailEnd type="none" w="med" len="med"/>
+                    </a:lnR>
+                    <a:lnT w="12700" cap="flat" cmpd="sng" algn="ctr">
+                      <a:solidFill>
+                        <a:schemeClr val="tx1"/>
+                      </a:solidFill>
+                      <a:prstDash val="solid"/>
+                      <a:round/>
+                      <a:headEnd type="none" w="med" len="med"/>
+                      <a:tailEnd type="none" w="med" len="med"/>
+                    </a:lnT>
+                    <a:lnB w="12700" cap="flat" cmpd="sng" algn="ctr">
+                      <a:solidFill>
+                        <a:schemeClr val="tx1"/>
+                      </a:solidFill>
+                      <a:prstDash val="solid"/>
+                      <a:round/>
+                      <a:headEnd type="none" w="med" len="med"/>
+                      <a:tailEnd type="none" w="med" len="med"/>
+                    </a:lnB>
+                    <a:solidFill>
+                      <a:srgbClr val="F2F2F2"/>
+                    </a:solidFill>
+                  </a:tcPr>
+                </a:tc>
+                <a:extLst>
+                  <a:ext uri="{0D108BD9-81ED-4DB2-BD59-A6C34878D82A}">
+                    <a16:rowId xmlns:a16="http://schemas.microsoft.com/office/drawing/2014/main" val="524414346"/>
+                  </a:ext>
+                </a:extLst>
+              </a:tr>
             </a:tbl>
           </a:graphicData>
         </a:graphic>
@@ -6909,7 +7084,7 @@
           <p:nvPr>
             <p:extLst>
               <p:ext uri="{D42A27DB-BD31-4B8C-83A1-F6EECF244321}">
-                <p14:modId xmlns:p14="http://schemas.microsoft.com/office/powerpoint/2010/main" val="3790173554"/>
+                <p14:modId xmlns:p14="http://schemas.microsoft.com/office/powerpoint/2010/main" val="929946203"/>
               </p:ext>
             </p:extLst>
           </p:nvPr>
@@ -7430,8 +7605,8 @@
         </p:nvCxnSpPr>
         <p:spPr>
           <a:xfrm flipH="1">
-            <a:off x="3306409" y="3061546"/>
-            <a:ext cx="5082" cy="1490848"/>
+            <a:off x="3306409" y="3084291"/>
+            <a:ext cx="5082" cy="1468103"/>
           </a:xfrm>
           <a:prstGeom prst="line">
             <a:avLst/>
@@ -8516,7 +8691,7 @@
           <p:nvPr>
             <p:extLst>
               <p:ext uri="{D42A27DB-BD31-4B8C-83A1-F6EECF244321}">
-                <p14:modId xmlns:p14="http://schemas.microsoft.com/office/powerpoint/2010/main" val="974684179"/>
+                <p14:modId xmlns:p14="http://schemas.microsoft.com/office/powerpoint/2010/main" val="1606828861"/>
               </p:ext>
             </p:extLst>
           </p:nvPr>
@@ -9212,7 +9387,7 @@
           <p:nvPr>
             <p:extLst>
               <p:ext uri="{D42A27DB-BD31-4B8C-83A1-F6EECF244321}">
-                <p14:modId xmlns:p14="http://schemas.microsoft.com/office/powerpoint/2010/main" val="665120291"/>
+                <p14:modId xmlns:p14="http://schemas.microsoft.com/office/powerpoint/2010/main" val="1729869275"/>
               </p:ext>
             </p:extLst>
           </p:nvPr>

</xml_diff>